<commit_message>
-ReactJS: 	-State, Components & Re-rendering 	-Array & Object Destructuring 	-useState
</commit_message>
<xml_diff>
--- a/Full Stack Engineer/Week 2 Node JS/Node JS - Completed.pptx
+++ b/Full Stack Engineer/Week 2 Node JS/Node JS - Completed.pptx
@@ -326,7 +326,7 @@
           <a:p>
             <a:fld id="{97F60D6A-E623-4333-878A-1B5B06E3C765}" type="datetimeFigureOut">
               <a:rPr lang="en-IN" smtClean="0"/>
-              <a:t>30-12-2025</a:t>
+              <a:t>03-01-2026</a:t>
             </a:fld>
             <a:endParaRPr lang="en-IN"/>
           </a:p>
@@ -526,7 +526,7 @@
           <a:p>
             <a:fld id="{97F60D6A-E623-4333-878A-1B5B06E3C765}" type="datetimeFigureOut">
               <a:rPr lang="en-IN" smtClean="0"/>
-              <a:t>30-12-2025</a:t>
+              <a:t>03-01-2026</a:t>
             </a:fld>
             <a:endParaRPr lang="en-IN"/>
           </a:p>
@@ -736,7 +736,7 @@
           <a:p>
             <a:fld id="{97F60D6A-E623-4333-878A-1B5B06E3C765}" type="datetimeFigureOut">
               <a:rPr lang="en-IN" smtClean="0"/>
-              <a:t>30-12-2025</a:t>
+              <a:t>03-01-2026</a:t>
             </a:fld>
             <a:endParaRPr lang="en-IN"/>
           </a:p>
@@ -936,7 +936,7 @@
           <a:p>
             <a:fld id="{97F60D6A-E623-4333-878A-1B5B06E3C765}" type="datetimeFigureOut">
               <a:rPr lang="en-IN" smtClean="0"/>
-              <a:t>30-12-2025</a:t>
+              <a:t>03-01-2026</a:t>
             </a:fld>
             <a:endParaRPr lang="en-IN"/>
           </a:p>
@@ -1212,7 +1212,7 @@
           <a:p>
             <a:fld id="{97F60D6A-E623-4333-878A-1B5B06E3C765}" type="datetimeFigureOut">
               <a:rPr lang="en-IN" smtClean="0"/>
-              <a:t>30-12-2025</a:t>
+              <a:t>03-01-2026</a:t>
             </a:fld>
             <a:endParaRPr lang="en-IN"/>
           </a:p>
@@ -1480,7 +1480,7 @@
           <a:p>
             <a:fld id="{97F60D6A-E623-4333-878A-1B5B06E3C765}" type="datetimeFigureOut">
               <a:rPr lang="en-IN" smtClean="0"/>
-              <a:t>30-12-2025</a:t>
+              <a:t>03-01-2026</a:t>
             </a:fld>
             <a:endParaRPr lang="en-IN"/>
           </a:p>
@@ -1895,7 +1895,7 @@
           <a:p>
             <a:fld id="{97F60D6A-E623-4333-878A-1B5B06E3C765}" type="datetimeFigureOut">
               <a:rPr lang="en-IN" smtClean="0"/>
-              <a:t>30-12-2025</a:t>
+              <a:t>03-01-2026</a:t>
             </a:fld>
             <a:endParaRPr lang="en-IN"/>
           </a:p>
@@ -2037,7 +2037,7 @@
           <a:p>
             <a:fld id="{97F60D6A-E623-4333-878A-1B5B06E3C765}" type="datetimeFigureOut">
               <a:rPr lang="en-IN" smtClean="0"/>
-              <a:t>30-12-2025</a:t>
+              <a:t>03-01-2026</a:t>
             </a:fld>
             <a:endParaRPr lang="en-IN"/>
           </a:p>
@@ -2150,7 +2150,7 @@
           <a:p>
             <a:fld id="{97F60D6A-E623-4333-878A-1B5B06E3C765}" type="datetimeFigureOut">
               <a:rPr lang="en-IN" smtClean="0"/>
-              <a:t>30-12-2025</a:t>
+              <a:t>03-01-2026</a:t>
             </a:fld>
             <a:endParaRPr lang="en-IN"/>
           </a:p>
@@ -2463,7 +2463,7 @@
           <a:p>
             <a:fld id="{97F60D6A-E623-4333-878A-1B5B06E3C765}" type="datetimeFigureOut">
               <a:rPr lang="en-IN" smtClean="0"/>
-              <a:t>30-12-2025</a:t>
+              <a:t>03-01-2026</a:t>
             </a:fld>
             <a:endParaRPr lang="en-IN"/>
           </a:p>
@@ -2752,7 +2752,7 @@
           <a:p>
             <a:fld id="{97F60D6A-E623-4333-878A-1B5B06E3C765}" type="datetimeFigureOut">
               <a:rPr lang="en-IN" smtClean="0"/>
-              <a:t>30-12-2025</a:t>
+              <a:t>03-01-2026</a:t>
             </a:fld>
             <a:endParaRPr lang="en-IN"/>
           </a:p>
@@ -2995,7 +2995,7 @@
           <a:p>
             <a:fld id="{97F60D6A-E623-4333-878A-1B5B06E3C765}" type="datetimeFigureOut">
               <a:rPr lang="en-IN" smtClean="0"/>
-              <a:t>30-12-2025</a:t>
+              <a:t>03-01-2026</a:t>
             </a:fld>
             <a:endParaRPr lang="en-IN"/>
           </a:p>
@@ -3446,6 +3446,36 @@
           </a:p>
         </p:txBody>
       </p:sp>
+      <p:pic>
+        <p:nvPicPr>
+          <p:cNvPr id="4" name="Picture 3">
+            <a:extLst>
+              <a:ext uri="{FF2B5EF4-FFF2-40B4-BE49-F238E27FC236}">
+                <a16:creationId xmlns:a16="http://schemas.microsoft.com/office/drawing/2014/main" id="{18B8A2FC-9C81-4FBC-8C61-E90BD8108A8B}"/>
+              </a:ext>
+            </a:extLst>
+          </p:cNvPr>
+          <p:cNvPicPr>
+            <a:picLocks noChangeAspect="1"/>
+          </p:cNvPicPr>
+          <p:nvPr/>
+        </p:nvPicPr>
+        <p:blipFill>
+          <a:blip r:embed="rId2"/>
+          <a:stretch>
+            <a:fillRect/>
+          </a:stretch>
+        </p:blipFill>
+        <p:spPr>
+          <a:xfrm>
+            <a:off x="2010311" y="4195906"/>
+            <a:ext cx="8001693" cy="1897544"/>
+          </a:xfrm>
+          <a:prstGeom prst="rect">
+            <a:avLst/>
+          </a:prstGeom>
+        </p:spPr>
+      </p:pic>
     </p:spTree>
     <p:extLst>
       <p:ext uri="{BB962C8B-B14F-4D97-AF65-F5344CB8AC3E}">

</xml_diff>